<commit_message>
correction of sensitivity analysis
</commit_message>
<xml_diff>
--- a/Transport Planning Presentation.pptx
+++ b/Transport Planning Presentation.pptx
@@ -5,14 +5,17 @@
     <p:sldMasterId id="2147483648" r:id="rId1"/>
   </p:sldMasterIdLst>
   <p:notesMasterIdLst>
-    <p:notesMasterId r:id="rId7"/>
+    <p:notesMasterId r:id="rId10"/>
   </p:notesMasterIdLst>
   <p:sldIdLst>
     <p:sldId id="258" r:id="rId2"/>
-    <p:sldId id="260" r:id="rId3"/>
-    <p:sldId id="261" r:id="rId4"/>
-    <p:sldId id="263" r:id="rId5"/>
-    <p:sldId id="259" r:id="rId6"/>
+    <p:sldId id="264" r:id="rId3"/>
+    <p:sldId id="265" r:id="rId4"/>
+    <p:sldId id="266" r:id="rId5"/>
+    <p:sldId id="260" r:id="rId6"/>
+    <p:sldId id="261" r:id="rId7"/>
+    <p:sldId id="263" r:id="rId8"/>
+    <p:sldId id="259" r:id="rId9"/>
   </p:sldIdLst>
   <p:sldSz cx="9144000" cy="6858000" type="screen4x3"/>
   <p:notesSz cx="6858000" cy="9144000"/>
@@ -142,6 +145,34 @@
     </a:lvl9pPr>
   </p:defaultTextStyle>
   <p:extLst>
+    <p:ext uri="{521415D9-36F7-43E2-AB2F-B90AF26B5E84}">
+      <p14:sectionLst xmlns:p14="http://schemas.microsoft.com/office/powerpoint/2010/main">
+        <p14:section name="Intro" id="{3ACCA49D-D48E-4628-BEAA-167FC19AA4F3}">
+          <p14:sldIdLst>
+            <p14:sldId id="258"/>
+          </p14:sldIdLst>
+        </p14:section>
+        <p14:section name="Descriptive" id="{C5C7C1DA-A012-40B9-9950-D848C885CF70}">
+          <p14:sldIdLst>
+            <p14:sldId id="264"/>
+          </p14:sldIdLst>
+        </p14:section>
+        <p14:section name="Models" id="{7B484B64-9355-4EAD-8A79-D66F63080C51}">
+          <p14:sldIdLst>
+            <p14:sldId id="265"/>
+          </p14:sldIdLst>
+        </p14:section>
+        <p14:section name="CBA" id="{0724CBA7-519D-417C-9D63-B4DB8A279873}">
+          <p14:sldIdLst>
+            <p14:sldId id="266"/>
+            <p14:sldId id="260"/>
+            <p14:sldId id="261"/>
+            <p14:sldId id="263"/>
+            <p14:sldId id="259"/>
+          </p14:sldIdLst>
+        </p14:section>
+      </p14:sectionLst>
+    </p:ext>
     <p:ext uri="{EFAFB233-063F-42B5-8137-9DF3F51BA10A}">
       <p15:sldGuideLst xmlns:p15="http://schemas.microsoft.com/office/powerpoint/2012/main">
         <p15:guide id="1" orient="horz" pos="2160">
@@ -183,6 +214,80 @@
     </p:ext>
   </p:extLst>
 </p:presentation>
+</file>
+
+<file path=ppt/changesInfos/changesInfo1.xml><?xml version="1.0" encoding="utf-8"?>
+<pc:chgInfo xmlns:a="http://schemas.openxmlformats.org/drawingml/2006/main" xmlns:r="http://schemas.openxmlformats.org/officeDocument/2006/relationships" xmlns:ac="http://schemas.microsoft.com/office/drawing/2013/main/command" xmlns:pc="http://schemas.microsoft.com/office/powerpoint/2013/main/command">
+  <pc:docChgLst>
+    <pc:chgData name="Thibault Vignon" userId="a630b34756993743" providerId="LiveId" clId="{647C3798-FB08-4F09-929B-E17443DE7470}"/>
+    <pc:docChg chg="custSel addSld modSld sldOrd addSection delSection modSection">
+      <pc:chgData name="Thibault Vignon" userId="a630b34756993743" providerId="LiveId" clId="{647C3798-FB08-4F09-929B-E17443DE7470}" dt="2022-12-14T09:53:56.621" v="419" actId="20577"/>
+      <pc:docMkLst>
+        <pc:docMk/>
+      </pc:docMkLst>
+      <pc:sldChg chg="modSp mod">
+        <pc:chgData name="Thibault Vignon" userId="a630b34756993743" providerId="LiveId" clId="{647C3798-FB08-4F09-929B-E17443DE7470}" dt="2022-12-14T09:29:07.219" v="13" actId="20577"/>
+        <pc:sldMkLst>
+          <pc:docMk/>
+          <pc:sldMk cId="2689265563" sldId="263"/>
+        </pc:sldMkLst>
+        <pc:spChg chg="mod">
+          <ac:chgData name="Thibault Vignon" userId="a630b34756993743" providerId="LiveId" clId="{647C3798-FB08-4F09-929B-E17443DE7470}" dt="2022-12-14T09:28:59.063" v="0" actId="21"/>
+          <ac:spMkLst>
+            <pc:docMk/>
+            <pc:sldMk cId="2689265563" sldId="263"/>
+            <ac:spMk id="3" creationId="{3528C7DC-E481-E0F8-6F38-3FFD9A2C4E98}"/>
+          </ac:spMkLst>
+        </pc:spChg>
+        <pc:spChg chg="mod">
+          <ac:chgData name="Thibault Vignon" userId="a630b34756993743" providerId="LiveId" clId="{647C3798-FB08-4F09-929B-E17443DE7470}" dt="2022-12-14T09:29:07.219" v="13" actId="20577"/>
+          <ac:spMkLst>
+            <pc:docMk/>
+            <pc:sldMk cId="2689265563" sldId="263"/>
+            <ac:spMk id="5" creationId="{8CE96E81-7FDA-CF8F-6803-F104EE5D1A21}"/>
+          </ac:spMkLst>
+        </pc:spChg>
+      </pc:sldChg>
+      <pc:sldChg chg="new">
+        <pc:chgData name="Thibault Vignon" userId="a630b34756993743" providerId="LiveId" clId="{647C3798-FB08-4F09-929B-E17443DE7470}" dt="2022-12-14T09:31:44.140" v="19" actId="680"/>
+        <pc:sldMkLst>
+          <pc:docMk/>
+          <pc:sldMk cId="2580151803" sldId="264"/>
+        </pc:sldMkLst>
+      </pc:sldChg>
+      <pc:sldChg chg="new">
+        <pc:chgData name="Thibault Vignon" userId="a630b34756993743" providerId="LiveId" clId="{647C3798-FB08-4F09-929B-E17443DE7470}" dt="2022-12-14T09:31:54.866" v="22" actId="680"/>
+        <pc:sldMkLst>
+          <pc:docMk/>
+          <pc:sldMk cId="1726686930" sldId="265"/>
+        </pc:sldMkLst>
+      </pc:sldChg>
+      <pc:sldChg chg="modSp new mod ord">
+        <pc:chgData name="Thibault Vignon" userId="a630b34756993743" providerId="LiveId" clId="{647C3798-FB08-4F09-929B-E17443DE7470}" dt="2022-12-14T09:53:56.621" v="419" actId="20577"/>
+        <pc:sldMkLst>
+          <pc:docMk/>
+          <pc:sldMk cId="2411909673" sldId="266"/>
+        </pc:sldMkLst>
+        <pc:spChg chg="mod">
+          <ac:chgData name="Thibault Vignon" userId="a630b34756993743" providerId="LiveId" clId="{647C3798-FB08-4F09-929B-E17443DE7470}" dt="2022-12-14T09:52:11.335" v="53" actId="20577"/>
+          <ac:spMkLst>
+            <pc:docMk/>
+            <pc:sldMk cId="2411909673" sldId="266"/>
+            <ac:spMk id="2" creationId="{3B3DF66A-9090-CD77-6B55-49E46B854DBA}"/>
+          </ac:spMkLst>
+        </pc:spChg>
+        <pc:spChg chg="mod">
+          <ac:chgData name="Thibault Vignon" userId="a630b34756993743" providerId="LiveId" clId="{647C3798-FB08-4F09-929B-E17443DE7470}" dt="2022-12-14T09:53:56.621" v="419" actId="20577"/>
+          <ac:spMkLst>
+            <pc:docMk/>
+            <pc:sldMk cId="2411909673" sldId="266"/>
+            <ac:spMk id="3" creationId="{8AC54CF7-BD5A-993E-C7E2-1EE7AAC9F65A}"/>
+          </ac:spMkLst>
+        </pc:spChg>
+      </pc:sldChg>
+    </pc:docChg>
+  </pc:docChgLst>
+</pc:chgInfo>
 </file>
 
 <file path=ppt/notesMasters/notesMaster1.xml><?xml version="1.0" encoding="utf-8"?>
@@ -834,7 +939,7 @@
             <a:fld id="{0EBADA53-0301-9946-B43C-9FFEEC3349E2}" type="slidenum">
               <a:rPr lang="en-GB" altLang="en-US"/>
               <a:pPr/>
-              <a:t>5</a:t>
+              <a:t>8</a:t>
             </a:fld>
             <a:endParaRPr lang="en-GB" altLang="en-US"/>
           </a:p>
@@ -4770,7 +4875,7 @@
           <p:cNvPr id="2" name="Title 1">
             <a:extLst>
               <a:ext uri="{FF2B5EF4-FFF2-40B4-BE49-F238E27FC236}">
-                <a16:creationId xmlns:a16="http://schemas.microsoft.com/office/drawing/2014/main" id="{9B7C2775-FE25-54B7-E121-794CE3FFDF2F}"/>
+                <a16:creationId xmlns:a16="http://schemas.microsoft.com/office/drawing/2014/main" id="{4B910B11-CE12-46B6-0A55-94A9C74224C2}"/>
               </a:ext>
             </a:extLst>
           </p:cNvPr>
@@ -4786,10 +4891,7 @@
           <a:bodyPr/>
           <a:lstStyle/>
           <a:p>
-            <a:r>
-              <a:rPr lang="en-US" dirty="0"/>
-              <a:t>CBA Assumptions</a:t>
-            </a:r>
+            <a:endParaRPr lang="en-US"/>
           </a:p>
         </p:txBody>
       </p:sp>
@@ -4798,7 +4900,7 @@
           <p:cNvPr id="3" name="Content Placeholder 2">
             <a:extLst>
               <a:ext uri="{FF2B5EF4-FFF2-40B4-BE49-F238E27FC236}">
-                <a16:creationId xmlns:a16="http://schemas.microsoft.com/office/drawing/2014/main" id="{CCA41E4B-FAF2-E0BB-628E-AA7A9F8FF83F}"/>
+                <a16:creationId xmlns:a16="http://schemas.microsoft.com/office/drawing/2014/main" id="{5763BF52-09A0-149D-8361-AA5A77502473}"/>
               </a:ext>
             </a:extLst>
           </p:cNvPr>
@@ -4814,48 +4916,6 @@
           <a:bodyPr/>
           <a:lstStyle/>
           <a:p>
-            <a:pPr>
-              <a:buFont typeface="Arial" panose="020B0604020202020204" pitchFamily="34" charset="0"/>
-              <a:buChar char="•"/>
-            </a:pPr>
-            <a:r>
-              <a:rPr lang="en-US" dirty="0"/>
-              <a:t>Travel demand will be constant to/from zones which were not affected by the policy</a:t>
-            </a:r>
-          </a:p>
-          <a:p>
-            <a:pPr>
-              <a:buFont typeface="Arial" panose="020B0604020202020204" pitchFamily="34" charset="0"/>
-              <a:buChar char="•"/>
-            </a:pPr>
-            <a:r>
-              <a:rPr lang="en-US" dirty="0"/>
-              <a:t>Operating costs for runnel will be equivalent to operating costs of current railroad</a:t>
-            </a:r>
-          </a:p>
-          <a:p>
-            <a:pPr>
-              <a:buFont typeface="Arial" panose="020B0604020202020204" pitchFamily="34" charset="0"/>
-              <a:buChar char="•"/>
-            </a:pPr>
-            <a:r>
-              <a:rPr lang="en-US" dirty="0"/>
-              <a:t>Car travel times are not affected by opening of rail tunnel or congestion tax </a:t>
-            </a:r>
-            <a:r>
-              <a:rPr lang="en-US" dirty="0">
-                <a:solidFill>
-                  <a:srgbClr val="FF0000"/>
-                </a:solidFill>
-              </a:rPr>
-              <a:t>(may want to get a value for how this does change – in reality decreased demand should effect travel times)</a:t>
-            </a:r>
-          </a:p>
-          <a:p>
-            <a:pPr>
-              <a:buFont typeface="Arial" panose="020B0604020202020204" pitchFamily="34" charset="0"/>
-              <a:buChar char="•"/>
-            </a:pPr>
             <a:endParaRPr lang="en-US" dirty="0"/>
           </a:p>
         </p:txBody>
@@ -4865,7 +4925,7 @@
           <p:cNvPr id="4" name="Slide Number Placeholder 3">
             <a:extLst>
               <a:ext uri="{FF2B5EF4-FFF2-40B4-BE49-F238E27FC236}">
-                <a16:creationId xmlns:a16="http://schemas.microsoft.com/office/drawing/2014/main" id="{6B346E47-D7F4-9A3D-7F01-A6F0A0AFF491}"/>
+                <a16:creationId xmlns:a16="http://schemas.microsoft.com/office/drawing/2014/main" id="{FD1E192F-9EBA-5F75-D951-B90547CE163F}"/>
               </a:ext>
             </a:extLst>
           </p:cNvPr>
@@ -4895,7 +4955,7 @@
     </p:spTree>
     <p:extLst>
       <p:ext uri="{BB962C8B-B14F-4D97-AF65-F5344CB8AC3E}">
-        <p14:creationId xmlns:p14="http://schemas.microsoft.com/office/powerpoint/2010/main" val="3618420233"/>
+        <p14:creationId xmlns:p14="http://schemas.microsoft.com/office/powerpoint/2010/main" val="2580151803"/>
       </p:ext>
     </p:extLst>
   </p:cSld>
@@ -4927,6 +4987,449 @@
           <p:cNvPr id="2" name="Title 1">
             <a:extLst>
               <a:ext uri="{FF2B5EF4-FFF2-40B4-BE49-F238E27FC236}">
+                <a16:creationId xmlns:a16="http://schemas.microsoft.com/office/drawing/2014/main" id="{1D1DAD60-A3B6-7D07-68D9-E8BA9F9C4D5C}"/>
+              </a:ext>
+            </a:extLst>
+          </p:cNvPr>
+          <p:cNvSpPr>
+            <a:spLocks noGrp="1"/>
+          </p:cNvSpPr>
+          <p:nvPr>
+            <p:ph type="title"/>
+          </p:nvPr>
+        </p:nvSpPr>
+        <p:spPr/>
+        <p:txBody>
+          <a:bodyPr/>
+          <a:lstStyle/>
+          <a:p>
+            <a:endParaRPr lang="en-US"/>
+          </a:p>
+        </p:txBody>
+      </p:sp>
+      <p:sp>
+        <p:nvSpPr>
+          <p:cNvPr id="3" name="Content Placeholder 2">
+            <a:extLst>
+              <a:ext uri="{FF2B5EF4-FFF2-40B4-BE49-F238E27FC236}">
+                <a16:creationId xmlns:a16="http://schemas.microsoft.com/office/drawing/2014/main" id="{5205D99C-62C4-EF64-8418-7029C2404EB0}"/>
+              </a:ext>
+            </a:extLst>
+          </p:cNvPr>
+          <p:cNvSpPr>
+            <a:spLocks noGrp="1"/>
+          </p:cNvSpPr>
+          <p:nvPr>
+            <p:ph idx="1"/>
+          </p:nvPr>
+        </p:nvSpPr>
+        <p:spPr/>
+        <p:txBody>
+          <a:bodyPr/>
+          <a:lstStyle/>
+          <a:p>
+            <a:endParaRPr lang="en-US"/>
+          </a:p>
+        </p:txBody>
+      </p:sp>
+      <p:sp>
+        <p:nvSpPr>
+          <p:cNvPr id="4" name="Slide Number Placeholder 3">
+            <a:extLst>
+              <a:ext uri="{FF2B5EF4-FFF2-40B4-BE49-F238E27FC236}">
+                <a16:creationId xmlns:a16="http://schemas.microsoft.com/office/drawing/2014/main" id="{F25C5C3D-86ED-998E-20B1-C93E5A41A8F0}"/>
+              </a:ext>
+            </a:extLst>
+          </p:cNvPr>
+          <p:cNvSpPr>
+            <a:spLocks noGrp="1"/>
+          </p:cNvSpPr>
+          <p:nvPr>
+            <p:ph type="sldNum" sz="quarter" idx="12"/>
+          </p:nvPr>
+        </p:nvSpPr>
+        <p:spPr/>
+        <p:txBody>
+          <a:bodyPr/>
+          <a:lstStyle/>
+          <a:p>
+            <a:fld id="{C427458D-7F65-FA4E-9B12-90631785AA9F}" type="slidenum">
+              <a:rPr lang="en-GB" altLang="en-US" smtClean="0"/>
+              <a:pPr/>
+              <a:t>3</a:t>
+            </a:fld>
+            <a:endParaRPr lang="en-GB" altLang="en-US" sz="1400">
+              <a:latin typeface="Times New Roman" panose="02020603050405020304" pitchFamily="18" charset="0"/>
+            </a:endParaRPr>
+          </a:p>
+        </p:txBody>
+      </p:sp>
+    </p:spTree>
+    <p:extLst>
+      <p:ext uri="{BB962C8B-B14F-4D97-AF65-F5344CB8AC3E}">
+        <p14:creationId xmlns:p14="http://schemas.microsoft.com/office/powerpoint/2010/main" val="1726686930"/>
+      </p:ext>
+    </p:extLst>
+  </p:cSld>
+  <p:clrMapOvr>
+    <a:masterClrMapping/>
+  </p:clrMapOvr>
+</p:sld>
+</file>
+
+<file path=ppt/slides/slide4.xml><?xml version="1.0" encoding="utf-8"?>
+<p:sld xmlns:a="http://schemas.openxmlformats.org/drawingml/2006/main" xmlns:r="http://schemas.openxmlformats.org/officeDocument/2006/relationships" xmlns:p="http://schemas.openxmlformats.org/presentationml/2006/main">
+  <p:cSld>
+    <p:spTree>
+      <p:nvGrpSpPr>
+        <p:cNvPr id="1" name=""/>
+        <p:cNvGrpSpPr/>
+        <p:nvPr/>
+      </p:nvGrpSpPr>
+      <p:grpSpPr>
+        <a:xfrm>
+          <a:off x="0" y="0"/>
+          <a:ext cx="0" cy="0"/>
+          <a:chOff x="0" y="0"/>
+          <a:chExt cx="0" cy="0"/>
+        </a:xfrm>
+      </p:grpSpPr>
+      <p:sp>
+        <p:nvSpPr>
+          <p:cNvPr id="2" name="Title 1">
+            <a:extLst>
+              <a:ext uri="{FF2B5EF4-FFF2-40B4-BE49-F238E27FC236}">
+                <a16:creationId xmlns:a16="http://schemas.microsoft.com/office/drawing/2014/main" id="{3B3DF66A-9090-CD77-6B55-49E46B854DBA}"/>
+              </a:ext>
+            </a:extLst>
+          </p:cNvPr>
+          <p:cNvSpPr>
+            <a:spLocks noGrp="1"/>
+          </p:cNvSpPr>
+          <p:nvPr>
+            <p:ph type="title"/>
+          </p:nvPr>
+        </p:nvSpPr>
+        <p:spPr/>
+        <p:txBody>
+          <a:bodyPr/>
+          <a:lstStyle/>
+          <a:p>
+            <a:r>
+              <a:rPr lang="en-US" dirty="0"/>
+              <a:t>Alternatives considered</a:t>
+            </a:r>
+          </a:p>
+        </p:txBody>
+      </p:sp>
+      <p:sp>
+        <p:nvSpPr>
+          <p:cNvPr id="3" name="Content Placeholder 2">
+            <a:extLst>
+              <a:ext uri="{FF2B5EF4-FFF2-40B4-BE49-F238E27FC236}">
+                <a16:creationId xmlns:a16="http://schemas.microsoft.com/office/drawing/2014/main" id="{8AC54CF7-BD5A-993E-C7E2-1EE7AAC9F65A}"/>
+              </a:ext>
+            </a:extLst>
+          </p:cNvPr>
+          <p:cNvSpPr>
+            <a:spLocks noGrp="1"/>
+          </p:cNvSpPr>
+          <p:nvPr>
+            <p:ph idx="1"/>
+          </p:nvPr>
+        </p:nvSpPr>
+        <p:spPr/>
+        <p:txBody>
+          <a:bodyPr/>
+          <a:lstStyle/>
+          <a:p>
+            <a:pPr>
+              <a:lnSpc>
+                <a:spcPct val="200000"/>
+              </a:lnSpc>
+              <a:buFont typeface="Arial" panose="020B0604020202020204" pitchFamily="34" charset="0"/>
+              <a:buChar char="•"/>
+            </a:pPr>
+            <a:r>
+              <a:rPr lang="en-US" dirty="0"/>
+              <a:t>Current situation</a:t>
+            </a:r>
+          </a:p>
+          <a:p>
+            <a:pPr>
+              <a:lnSpc>
+                <a:spcPct val="200000"/>
+              </a:lnSpc>
+              <a:buFont typeface="Arial" panose="020B0604020202020204" pitchFamily="34" charset="0"/>
+              <a:buChar char="•"/>
+            </a:pPr>
+            <a:r>
+              <a:rPr lang="en-US" dirty="0"/>
+              <a:t>Build a new rail tunnel connecting the zones of Zurich and </a:t>
+            </a:r>
+            <a:r>
+              <a:rPr lang="en-US" dirty="0" err="1"/>
+              <a:t>Bulach</a:t>
+            </a:r>
+            <a:r>
+              <a:rPr lang="en-US" dirty="0"/>
+              <a:t> : 40% reduction in PT travel time for this O/D pair</a:t>
+            </a:r>
+          </a:p>
+          <a:p>
+            <a:pPr>
+              <a:lnSpc>
+                <a:spcPct val="200000"/>
+              </a:lnSpc>
+              <a:buFont typeface="Arial" panose="020B0604020202020204" pitchFamily="34" charset="0"/>
+              <a:buChar char="•"/>
+            </a:pPr>
+            <a:r>
+              <a:rPr lang="en-US" dirty="0"/>
+              <a:t>Implement a congestion tax of 10 CHF on every trip entering </a:t>
+            </a:r>
+            <a:r>
+              <a:rPr lang="en-US"/>
+              <a:t>or leaving zone Zurich</a:t>
+            </a:r>
+            <a:endParaRPr lang="en-US" dirty="0"/>
+          </a:p>
+          <a:p>
+            <a:pPr>
+              <a:lnSpc>
+                <a:spcPct val="200000"/>
+              </a:lnSpc>
+              <a:buFont typeface="Arial" panose="020B0604020202020204" pitchFamily="34" charset="0"/>
+              <a:buChar char="•"/>
+            </a:pPr>
+            <a:endParaRPr lang="en-US" dirty="0"/>
+          </a:p>
+        </p:txBody>
+      </p:sp>
+      <p:sp>
+        <p:nvSpPr>
+          <p:cNvPr id="4" name="Slide Number Placeholder 3">
+            <a:extLst>
+              <a:ext uri="{FF2B5EF4-FFF2-40B4-BE49-F238E27FC236}">
+                <a16:creationId xmlns:a16="http://schemas.microsoft.com/office/drawing/2014/main" id="{62686A74-D733-4DFF-9AC7-9B6DF8027B53}"/>
+              </a:ext>
+            </a:extLst>
+          </p:cNvPr>
+          <p:cNvSpPr>
+            <a:spLocks noGrp="1"/>
+          </p:cNvSpPr>
+          <p:nvPr>
+            <p:ph type="sldNum" sz="quarter" idx="12"/>
+          </p:nvPr>
+        </p:nvSpPr>
+        <p:spPr/>
+        <p:txBody>
+          <a:bodyPr/>
+          <a:lstStyle/>
+          <a:p>
+            <a:fld id="{C427458D-7F65-FA4E-9B12-90631785AA9F}" type="slidenum">
+              <a:rPr lang="en-GB" altLang="en-US" smtClean="0"/>
+              <a:pPr/>
+              <a:t>4</a:t>
+            </a:fld>
+            <a:endParaRPr lang="en-GB" altLang="en-US" sz="1400">
+              <a:latin typeface="Times New Roman" panose="02020603050405020304" pitchFamily="18" charset="0"/>
+            </a:endParaRPr>
+          </a:p>
+        </p:txBody>
+      </p:sp>
+    </p:spTree>
+    <p:extLst>
+      <p:ext uri="{BB962C8B-B14F-4D97-AF65-F5344CB8AC3E}">
+        <p14:creationId xmlns:p14="http://schemas.microsoft.com/office/powerpoint/2010/main" val="2411909673"/>
+      </p:ext>
+    </p:extLst>
+  </p:cSld>
+  <p:clrMapOvr>
+    <a:masterClrMapping/>
+  </p:clrMapOvr>
+</p:sld>
+</file>
+
+<file path=ppt/slides/slide5.xml><?xml version="1.0" encoding="utf-8"?>
+<p:sld xmlns:a="http://schemas.openxmlformats.org/drawingml/2006/main" xmlns:r="http://schemas.openxmlformats.org/officeDocument/2006/relationships" xmlns:p="http://schemas.openxmlformats.org/presentationml/2006/main">
+  <p:cSld>
+    <p:spTree>
+      <p:nvGrpSpPr>
+        <p:cNvPr id="1" name=""/>
+        <p:cNvGrpSpPr/>
+        <p:nvPr/>
+      </p:nvGrpSpPr>
+      <p:grpSpPr>
+        <a:xfrm>
+          <a:off x="0" y="0"/>
+          <a:ext cx="0" cy="0"/>
+          <a:chOff x="0" y="0"/>
+          <a:chExt cx="0" cy="0"/>
+        </a:xfrm>
+      </p:grpSpPr>
+      <p:sp>
+        <p:nvSpPr>
+          <p:cNvPr id="2" name="Title 1">
+            <a:extLst>
+              <a:ext uri="{FF2B5EF4-FFF2-40B4-BE49-F238E27FC236}">
+                <a16:creationId xmlns:a16="http://schemas.microsoft.com/office/drawing/2014/main" id="{9B7C2775-FE25-54B7-E121-794CE3FFDF2F}"/>
+              </a:ext>
+            </a:extLst>
+          </p:cNvPr>
+          <p:cNvSpPr>
+            <a:spLocks noGrp="1"/>
+          </p:cNvSpPr>
+          <p:nvPr>
+            <p:ph type="title"/>
+          </p:nvPr>
+        </p:nvSpPr>
+        <p:spPr/>
+        <p:txBody>
+          <a:bodyPr/>
+          <a:lstStyle/>
+          <a:p>
+            <a:r>
+              <a:rPr lang="en-US" dirty="0"/>
+              <a:t>CBA Assumptions</a:t>
+            </a:r>
+          </a:p>
+        </p:txBody>
+      </p:sp>
+      <p:sp>
+        <p:nvSpPr>
+          <p:cNvPr id="3" name="Content Placeholder 2">
+            <a:extLst>
+              <a:ext uri="{FF2B5EF4-FFF2-40B4-BE49-F238E27FC236}">
+                <a16:creationId xmlns:a16="http://schemas.microsoft.com/office/drawing/2014/main" id="{CCA41E4B-FAF2-E0BB-628E-AA7A9F8FF83F}"/>
+              </a:ext>
+            </a:extLst>
+          </p:cNvPr>
+          <p:cNvSpPr>
+            <a:spLocks noGrp="1"/>
+          </p:cNvSpPr>
+          <p:nvPr>
+            <p:ph idx="1"/>
+          </p:nvPr>
+        </p:nvSpPr>
+        <p:spPr/>
+        <p:txBody>
+          <a:bodyPr/>
+          <a:lstStyle/>
+          <a:p>
+            <a:pPr>
+              <a:buFont typeface="Arial" panose="020B0604020202020204" pitchFamily="34" charset="0"/>
+              <a:buChar char="•"/>
+            </a:pPr>
+            <a:r>
+              <a:rPr lang="en-US" dirty="0"/>
+              <a:t>Travel demand will be constant to/from zones which were not affected by the policy</a:t>
+            </a:r>
+          </a:p>
+          <a:p>
+            <a:pPr>
+              <a:buFont typeface="Arial" panose="020B0604020202020204" pitchFamily="34" charset="0"/>
+              <a:buChar char="•"/>
+            </a:pPr>
+            <a:r>
+              <a:rPr lang="en-US" dirty="0"/>
+              <a:t>Operating costs for runnel will be equivalent to operating costs of current railroad</a:t>
+            </a:r>
+          </a:p>
+          <a:p>
+            <a:pPr>
+              <a:buFont typeface="Arial" panose="020B0604020202020204" pitchFamily="34" charset="0"/>
+              <a:buChar char="•"/>
+            </a:pPr>
+            <a:r>
+              <a:rPr lang="en-US" dirty="0"/>
+              <a:t>Car travel times are not affected by opening of rail tunnel or congestion tax </a:t>
+            </a:r>
+            <a:r>
+              <a:rPr lang="en-US" dirty="0">
+                <a:solidFill>
+                  <a:srgbClr val="FF0000"/>
+                </a:solidFill>
+              </a:rPr>
+              <a:t>(may want to get a value for how this does change – in reality decreased demand should effect travel times)</a:t>
+            </a:r>
+          </a:p>
+          <a:p>
+            <a:pPr>
+              <a:buFont typeface="Arial" panose="020B0604020202020204" pitchFamily="34" charset="0"/>
+              <a:buChar char="•"/>
+            </a:pPr>
+            <a:endParaRPr lang="en-US" dirty="0"/>
+          </a:p>
+        </p:txBody>
+      </p:sp>
+      <p:sp>
+        <p:nvSpPr>
+          <p:cNvPr id="4" name="Slide Number Placeholder 3">
+            <a:extLst>
+              <a:ext uri="{FF2B5EF4-FFF2-40B4-BE49-F238E27FC236}">
+                <a16:creationId xmlns:a16="http://schemas.microsoft.com/office/drawing/2014/main" id="{6B346E47-D7F4-9A3D-7F01-A6F0A0AFF491}"/>
+              </a:ext>
+            </a:extLst>
+          </p:cNvPr>
+          <p:cNvSpPr>
+            <a:spLocks noGrp="1"/>
+          </p:cNvSpPr>
+          <p:nvPr>
+            <p:ph type="sldNum" sz="quarter" idx="12"/>
+          </p:nvPr>
+        </p:nvSpPr>
+        <p:spPr/>
+        <p:txBody>
+          <a:bodyPr/>
+          <a:lstStyle/>
+          <a:p>
+            <a:fld id="{C427458D-7F65-FA4E-9B12-90631785AA9F}" type="slidenum">
+              <a:rPr lang="en-GB" altLang="en-US" smtClean="0"/>
+              <a:pPr/>
+              <a:t>5</a:t>
+            </a:fld>
+            <a:endParaRPr lang="en-GB" altLang="en-US" sz="1400">
+              <a:latin typeface="Times New Roman" panose="02020603050405020304" pitchFamily="18" charset="0"/>
+            </a:endParaRPr>
+          </a:p>
+        </p:txBody>
+      </p:sp>
+    </p:spTree>
+    <p:extLst>
+      <p:ext uri="{BB962C8B-B14F-4D97-AF65-F5344CB8AC3E}">
+        <p14:creationId xmlns:p14="http://schemas.microsoft.com/office/powerpoint/2010/main" val="3618420233"/>
+      </p:ext>
+    </p:extLst>
+  </p:cSld>
+  <p:clrMapOvr>
+    <a:masterClrMapping/>
+  </p:clrMapOvr>
+</p:sld>
+</file>
+
+<file path=ppt/slides/slide6.xml><?xml version="1.0" encoding="utf-8"?>
+<p:sld xmlns:a="http://schemas.openxmlformats.org/drawingml/2006/main" xmlns:r="http://schemas.openxmlformats.org/officeDocument/2006/relationships" xmlns:p="http://schemas.openxmlformats.org/presentationml/2006/main">
+  <p:cSld>
+    <p:spTree>
+      <p:nvGrpSpPr>
+        <p:cNvPr id="1" name=""/>
+        <p:cNvGrpSpPr/>
+        <p:nvPr/>
+      </p:nvGrpSpPr>
+      <p:grpSpPr>
+        <a:xfrm>
+          <a:off x="0" y="0"/>
+          <a:ext cx="0" cy="0"/>
+          <a:chOff x="0" y="0"/>
+          <a:chExt cx="0" cy="0"/>
+        </a:xfrm>
+      </p:grpSpPr>
+      <p:sp>
+        <p:nvSpPr>
+          <p:cNvPr id="2" name="Title 1">
+            <a:extLst>
+              <a:ext uri="{FF2B5EF4-FFF2-40B4-BE49-F238E27FC236}">
                 <a16:creationId xmlns:a16="http://schemas.microsoft.com/office/drawing/2014/main" id="{8593596B-227D-2C33-C0A1-906F86371A55}"/>
               </a:ext>
             </a:extLst>
@@ -5121,7 +5624,7 @@
             <a:fld id="{C427458D-7F65-FA4E-9B12-90631785AA9F}" type="slidenum">
               <a:rPr lang="en-GB" altLang="en-US" smtClean="0"/>
               <a:pPr/>
-              <a:t>3</a:t>
+              <a:t>6</a:t>
             </a:fld>
             <a:endParaRPr lang="en-GB" altLang="en-US" sz="1400">
               <a:latin typeface="Times New Roman" panose="02020603050405020304" pitchFamily="18" charset="0"/>
@@ -5538,7 +6041,7 @@
 </p:sld>
 </file>
 
-<file path=ppt/slides/slide4.xml><?xml version="1.0" encoding="utf-8"?>
+<file path=ppt/slides/slide7.xml><?xml version="1.0" encoding="utf-8"?>
 <p:sld xmlns:a="http://schemas.openxmlformats.org/drawingml/2006/main" xmlns:r="http://schemas.openxmlformats.org/officeDocument/2006/relationships" xmlns:p="http://schemas.openxmlformats.org/presentationml/2006/main">
   <p:cSld>
     <p:spTree>
@@ -5615,16 +6118,6 @@
             </a:pPr>
             <a:r>
               <a:rPr lang="en-US" sz="1800" dirty="0"/>
-              <a:t>Cost to drivers</a:t>
-            </a:r>
-          </a:p>
-          <a:p>
-            <a:pPr>
-              <a:buFont typeface="Arial" panose="020B0604020202020204" pitchFamily="34" charset="0"/>
-              <a:buChar char="•"/>
-            </a:pPr>
-            <a:r>
-              <a:rPr lang="en-US" sz="1800" dirty="0"/>
               <a:t>5% operating costs</a:t>
             </a:r>
           </a:p>
@@ -5654,7 +6147,7 @@
             <a:fld id="{C427458D-7F65-FA4E-9B12-90631785AA9F}" type="slidenum">
               <a:rPr lang="en-GB" altLang="en-US" smtClean="0"/>
               <a:pPr/>
-              <a:t>4</a:t>
+              <a:t>7</a:t>
             </a:fld>
             <a:endParaRPr lang="en-GB" altLang="en-US" sz="1400">
               <a:latin typeface="Times New Roman" panose="02020603050405020304" pitchFamily="18" charset="0"/>
@@ -5889,7 +6382,17 @@
             </a:pPr>
             <a:r>
               <a:rPr lang="en-US" sz="1800" dirty="0"/>
-              <a:t>Public revenue</a:t>
+              <a:t>Cost to drivers</a:t>
+            </a:r>
+          </a:p>
+          <a:p>
+            <a:pPr>
+              <a:buFont typeface="Arial" panose="020B0604020202020204" pitchFamily="34" charset="0"/>
+              <a:buChar char="•"/>
+            </a:pPr>
+            <a:r>
+              <a:rPr lang="en-US" sz="1800" dirty="0"/>
+              <a:t>Public revenue from tax</a:t>
             </a:r>
           </a:p>
           <a:p>
@@ -6081,7 +6584,7 @@
 </p:sld>
 </file>
 
-<file path=ppt/slides/slide5.xml><?xml version="1.0" encoding="utf-8"?>
+<file path=ppt/slides/slide8.xml><?xml version="1.0" encoding="utf-8"?>
 <p:sld xmlns:a="http://schemas.openxmlformats.org/drawingml/2006/main" xmlns:r="http://schemas.openxmlformats.org/officeDocument/2006/relationships" xmlns:p="http://schemas.openxmlformats.org/presentationml/2006/main">
   <p:cSld>
     <p:spTree>
@@ -6122,7 +6625,7 @@
             <a:fld id="{A436721E-3B1A-3149-A782-C7FF9933E5F0}" type="slidenum">
               <a:rPr lang="en-GB" altLang="en-US"/>
               <a:pPr/>
-              <a:t>5</a:t>
+              <a:t>8</a:t>
             </a:fld>
             <a:endParaRPr lang="en-GB" altLang="en-US" sz="1400">
               <a:latin typeface="Times New Roman" panose="02020603050405020304" pitchFamily="18" charset="0"/>

</xml_diff>